<commit_message>
add uniqueness of university name
</commit_message>
<xml_diff>
--- a/CollaSciTablesrelationship.pptx
+++ b/CollaSciTablesrelationship.pptx
@@ -116,6 +116,11 @@
       </a:defRPr>
     </a:lvl9pPr>
   </p:defaultTextStyle>
+  <p:extLst>
+    <p:ext uri="{EFAFB233-063F-42B5-8137-9DF3F51BA10A}">
+      <p15:sldGuideLst xmlns:p15="http://schemas.microsoft.com/office/powerpoint/2012/main"/>
+    </p:ext>
+  </p:extLst>
 </p:presentation>
 </file>
 
@@ -266,7 +271,7 @@
           <a:p>
             <a:fld id="{A522E3EC-CA61-4C0B-B5C8-CC92AB6EF10D}" type="datetimeFigureOut">
               <a:rPr lang="en-US" smtClean="0"/>
-              <a:t>8/30/2022</a:t>
+              <a:t>8/31/2022</a:t>
             </a:fld>
             <a:endParaRPr lang="en-US"/>
           </a:p>
@@ -464,7 +469,7 @@
           <a:p>
             <a:fld id="{A522E3EC-CA61-4C0B-B5C8-CC92AB6EF10D}" type="datetimeFigureOut">
               <a:rPr lang="en-US" smtClean="0"/>
-              <a:t>8/30/2022</a:t>
+              <a:t>8/31/2022</a:t>
             </a:fld>
             <a:endParaRPr lang="en-US"/>
           </a:p>
@@ -672,7 +677,7 @@
           <a:p>
             <a:fld id="{A522E3EC-CA61-4C0B-B5C8-CC92AB6EF10D}" type="datetimeFigureOut">
               <a:rPr lang="en-US" smtClean="0"/>
-              <a:t>8/30/2022</a:t>
+              <a:t>8/31/2022</a:t>
             </a:fld>
             <a:endParaRPr lang="en-US"/>
           </a:p>
@@ -870,7 +875,7 @@
           <a:p>
             <a:fld id="{A522E3EC-CA61-4C0B-B5C8-CC92AB6EF10D}" type="datetimeFigureOut">
               <a:rPr lang="en-US" smtClean="0"/>
-              <a:t>8/30/2022</a:t>
+              <a:t>8/31/2022</a:t>
             </a:fld>
             <a:endParaRPr lang="en-US"/>
           </a:p>
@@ -1145,7 +1150,7 @@
           <a:p>
             <a:fld id="{A522E3EC-CA61-4C0B-B5C8-CC92AB6EF10D}" type="datetimeFigureOut">
               <a:rPr lang="en-US" smtClean="0"/>
-              <a:t>8/30/2022</a:t>
+              <a:t>8/31/2022</a:t>
             </a:fld>
             <a:endParaRPr lang="en-US"/>
           </a:p>
@@ -1410,7 +1415,7 @@
           <a:p>
             <a:fld id="{A522E3EC-CA61-4C0B-B5C8-CC92AB6EF10D}" type="datetimeFigureOut">
               <a:rPr lang="en-US" smtClean="0"/>
-              <a:t>8/30/2022</a:t>
+              <a:t>8/31/2022</a:t>
             </a:fld>
             <a:endParaRPr lang="en-US"/>
           </a:p>
@@ -1822,7 +1827,7 @@
           <a:p>
             <a:fld id="{A522E3EC-CA61-4C0B-B5C8-CC92AB6EF10D}" type="datetimeFigureOut">
               <a:rPr lang="en-US" smtClean="0"/>
-              <a:t>8/30/2022</a:t>
+              <a:t>8/31/2022</a:t>
             </a:fld>
             <a:endParaRPr lang="en-US"/>
           </a:p>
@@ -1963,7 +1968,7 @@
           <a:p>
             <a:fld id="{A522E3EC-CA61-4C0B-B5C8-CC92AB6EF10D}" type="datetimeFigureOut">
               <a:rPr lang="en-US" smtClean="0"/>
-              <a:t>8/30/2022</a:t>
+              <a:t>8/31/2022</a:t>
             </a:fld>
             <a:endParaRPr lang="en-US"/>
           </a:p>
@@ -2076,7 +2081,7 @@
           <a:p>
             <a:fld id="{A522E3EC-CA61-4C0B-B5C8-CC92AB6EF10D}" type="datetimeFigureOut">
               <a:rPr lang="en-US" smtClean="0"/>
-              <a:t>8/30/2022</a:t>
+              <a:t>8/31/2022</a:t>
             </a:fld>
             <a:endParaRPr lang="en-US"/>
           </a:p>
@@ -2387,7 +2392,7 @@
           <a:p>
             <a:fld id="{A522E3EC-CA61-4C0B-B5C8-CC92AB6EF10D}" type="datetimeFigureOut">
               <a:rPr lang="en-US" smtClean="0"/>
-              <a:t>8/30/2022</a:t>
+              <a:t>8/31/2022</a:t>
             </a:fld>
             <a:endParaRPr lang="en-US"/>
           </a:p>
@@ -2675,7 +2680,7 @@
           <a:p>
             <a:fld id="{A522E3EC-CA61-4C0B-B5C8-CC92AB6EF10D}" type="datetimeFigureOut">
               <a:rPr lang="en-US" smtClean="0"/>
-              <a:t>8/30/2022</a:t>
+              <a:t>8/31/2022</a:t>
             </a:fld>
             <a:endParaRPr lang="en-US"/>
           </a:p>
@@ -2916,7 +2921,7 @@
           <a:p>
             <a:fld id="{A522E3EC-CA61-4C0B-B5C8-CC92AB6EF10D}" type="datetimeFigureOut">
               <a:rPr lang="en-US" smtClean="0"/>
-              <a:t>8/30/2022</a:t>
+              <a:t>8/31/2022</a:t>
             </a:fld>
             <a:endParaRPr lang="en-US"/>
           </a:p>
@@ -3494,6 +3499,17 @@
           </a:p>
           <a:p>
             <a:r>
+              <a:rPr lang="en-US" dirty="0"/>
+              <a:t>Date </a:t>
+            </a:r>
+            <a:r>
+              <a:rPr lang="en-US" dirty="0" err="1"/>
+              <a:t>DATE</a:t>
+            </a:r>
+            <a:endParaRPr lang="en-US" dirty="0"/>
+          </a:p>
+          <a:p>
+            <a:r>
               <a:rPr lang="en-US" dirty="0" err="1"/>
               <a:t>Compound_id</a:t>
             </a:r>

</xml_diff>

<commit_message>
add status, material_type, compound and experiment_type tables
</commit_message>
<xml_diff>
--- a/CollaSciTablesrelationship.pptx
+++ b/CollaSciTablesrelationship.pptx
@@ -271,7 +271,7 @@
           <a:p>
             <a:fld id="{A522E3EC-CA61-4C0B-B5C8-CC92AB6EF10D}" type="datetimeFigureOut">
               <a:rPr lang="en-US" smtClean="0"/>
-              <a:t>8/31/2022</a:t>
+              <a:t>9/1/2022</a:t>
             </a:fld>
             <a:endParaRPr lang="en-US"/>
           </a:p>
@@ -469,7 +469,7 @@
           <a:p>
             <a:fld id="{A522E3EC-CA61-4C0B-B5C8-CC92AB6EF10D}" type="datetimeFigureOut">
               <a:rPr lang="en-US" smtClean="0"/>
-              <a:t>8/31/2022</a:t>
+              <a:t>9/1/2022</a:t>
             </a:fld>
             <a:endParaRPr lang="en-US"/>
           </a:p>
@@ -677,7 +677,7 @@
           <a:p>
             <a:fld id="{A522E3EC-CA61-4C0B-B5C8-CC92AB6EF10D}" type="datetimeFigureOut">
               <a:rPr lang="en-US" smtClean="0"/>
-              <a:t>8/31/2022</a:t>
+              <a:t>9/1/2022</a:t>
             </a:fld>
             <a:endParaRPr lang="en-US"/>
           </a:p>
@@ -875,7 +875,7 @@
           <a:p>
             <a:fld id="{A522E3EC-CA61-4C0B-B5C8-CC92AB6EF10D}" type="datetimeFigureOut">
               <a:rPr lang="en-US" smtClean="0"/>
-              <a:t>8/31/2022</a:t>
+              <a:t>9/1/2022</a:t>
             </a:fld>
             <a:endParaRPr lang="en-US"/>
           </a:p>
@@ -1150,7 +1150,7 @@
           <a:p>
             <a:fld id="{A522E3EC-CA61-4C0B-B5C8-CC92AB6EF10D}" type="datetimeFigureOut">
               <a:rPr lang="en-US" smtClean="0"/>
-              <a:t>8/31/2022</a:t>
+              <a:t>9/1/2022</a:t>
             </a:fld>
             <a:endParaRPr lang="en-US"/>
           </a:p>
@@ -1415,7 +1415,7 @@
           <a:p>
             <a:fld id="{A522E3EC-CA61-4C0B-B5C8-CC92AB6EF10D}" type="datetimeFigureOut">
               <a:rPr lang="en-US" smtClean="0"/>
-              <a:t>8/31/2022</a:t>
+              <a:t>9/1/2022</a:t>
             </a:fld>
             <a:endParaRPr lang="en-US"/>
           </a:p>
@@ -1827,7 +1827,7 @@
           <a:p>
             <a:fld id="{A522E3EC-CA61-4C0B-B5C8-CC92AB6EF10D}" type="datetimeFigureOut">
               <a:rPr lang="en-US" smtClean="0"/>
-              <a:t>8/31/2022</a:t>
+              <a:t>9/1/2022</a:t>
             </a:fld>
             <a:endParaRPr lang="en-US"/>
           </a:p>
@@ -1968,7 +1968,7 @@
           <a:p>
             <a:fld id="{A522E3EC-CA61-4C0B-B5C8-CC92AB6EF10D}" type="datetimeFigureOut">
               <a:rPr lang="en-US" smtClean="0"/>
-              <a:t>8/31/2022</a:t>
+              <a:t>9/1/2022</a:t>
             </a:fld>
             <a:endParaRPr lang="en-US"/>
           </a:p>
@@ -2081,7 +2081,7 @@
           <a:p>
             <a:fld id="{A522E3EC-CA61-4C0B-B5C8-CC92AB6EF10D}" type="datetimeFigureOut">
               <a:rPr lang="en-US" smtClean="0"/>
-              <a:t>8/31/2022</a:t>
+              <a:t>9/1/2022</a:t>
             </a:fld>
             <a:endParaRPr lang="en-US"/>
           </a:p>
@@ -2392,7 +2392,7 @@
           <a:p>
             <a:fld id="{A522E3EC-CA61-4C0B-B5C8-CC92AB6EF10D}" type="datetimeFigureOut">
               <a:rPr lang="en-US" smtClean="0"/>
-              <a:t>8/31/2022</a:t>
+              <a:t>9/1/2022</a:t>
             </a:fld>
             <a:endParaRPr lang="en-US"/>
           </a:p>
@@ -2680,7 +2680,7 @@
           <a:p>
             <a:fld id="{A522E3EC-CA61-4C0B-B5C8-CC92AB6EF10D}" type="datetimeFigureOut">
               <a:rPr lang="en-US" smtClean="0"/>
-              <a:t>8/31/2022</a:t>
+              <a:t>9/1/2022</a:t>
             </a:fld>
             <a:endParaRPr lang="en-US"/>
           </a:p>
@@ -2921,7 +2921,7 @@
           <a:p>
             <a:fld id="{A522E3EC-CA61-4C0B-B5C8-CC92AB6EF10D}" type="datetimeFigureOut">
               <a:rPr lang="en-US" smtClean="0"/>
-              <a:t>8/31/2022</a:t>
+              <a:t>9/1/2022</a:t>
             </a:fld>
             <a:endParaRPr lang="en-US"/>
           </a:p>

</xml_diff>

<commit_message>
add the user table
</commit_message>
<xml_diff>
--- a/CollaSciTablesrelationship.pptx
+++ b/CollaSciTablesrelationship.pptx
@@ -4691,13 +4691,13 @@
         </p:spPr>
         <p:style>
           <a:lnRef idx="3">
-            <a:schemeClr val="accent2"/>
+            <a:schemeClr val="dk1"/>
           </a:lnRef>
           <a:fillRef idx="0">
-            <a:schemeClr val="accent2"/>
+            <a:schemeClr val="dk1"/>
           </a:fillRef>
           <a:effectRef idx="2">
-            <a:schemeClr val="accent2"/>
+            <a:schemeClr val="dk1"/>
           </a:effectRef>
           <a:fontRef idx="minor">
             <a:schemeClr val="tx1"/>
@@ -4734,13 +4734,13 @@
         </p:spPr>
         <p:style>
           <a:lnRef idx="3">
-            <a:schemeClr val="accent2"/>
+            <a:schemeClr val="dk1"/>
           </a:lnRef>
           <a:fillRef idx="0">
-            <a:schemeClr val="accent2"/>
+            <a:schemeClr val="dk1"/>
           </a:fillRef>
           <a:effectRef idx="2">
-            <a:schemeClr val="accent2"/>
+            <a:schemeClr val="dk1"/>
           </a:effectRef>
           <a:fontRef idx="minor">
             <a:schemeClr val="tx1"/>

</xml_diff>

<commit_message>
Add experiment setup table
</commit_message>
<xml_diff>
--- a/CollaSciTablesrelationship.pptx
+++ b/CollaSciTablesrelationship.pptx
@@ -271,7 +271,7 @@
           <a:p>
             <a:fld id="{A522E3EC-CA61-4C0B-B5C8-CC92AB6EF10D}" type="datetimeFigureOut">
               <a:rPr lang="en-US" smtClean="0"/>
-              <a:t>9/1/2022</a:t>
+              <a:t>9/3/2022</a:t>
             </a:fld>
             <a:endParaRPr lang="en-US"/>
           </a:p>
@@ -469,7 +469,7 @@
           <a:p>
             <a:fld id="{A522E3EC-CA61-4C0B-B5C8-CC92AB6EF10D}" type="datetimeFigureOut">
               <a:rPr lang="en-US" smtClean="0"/>
-              <a:t>9/1/2022</a:t>
+              <a:t>9/3/2022</a:t>
             </a:fld>
             <a:endParaRPr lang="en-US"/>
           </a:p>
@@ -677,7 +677,7 @@
           <a:p>
             <a:fld id="{A522E3EC-CA61-4C0B-B5C8-CC92AB6EF10D}" type="datetimeFigureOut">
               <a:rPr lang="en-US" smtClean="0"/>
-              <a:t>9/1/2022</a:t>
+              <a:t>9/3/2022</a:t>
             </a:fld>
             <a:endParaRPr lang="en-US"/>
           </a:p>
@@ -875,7 +875,7 @@
           <a:p>
             <a:fld id="{A522E3EC-CA61-4C0B-B5C8-CC92AB6EF10D}" type="datetimeFigureOut">
               <a:rPr lang="en-US" smtClean="0"/>
-              <a:t>9/1/2022</a:t>
+              <a:t>9/3/2022</a:t>
             </a:fld>
             <a:endParaRPr lang="en-US"/>
           </a:p>
@@ -1150,7 +1150,7 @@
           <a:p>
             <a:fld id="{A522E3EC-CA61-4C0B-B5C8-CC92AB6EF10D}" type="datetimeFigureOut">
               <a:rPr lang="en-US" smtClean="0"/>
-              <a:t>9/1/2022</a:t>
+              <a:t>9/3/2022</a:t>
             </a:fld>
             <a:endParaRPr lang="en-US"/>
           </a:p>
@@ -1415,7 +1415,7 @@
           <a:p>
             <a:fld id="{A522E3EC-CA61-4C0B-B5C8-CC92AB6EF10D}" type="datetimeFigureOut">
               <a:rPr lang="en-US" smtClean="0"/>
-              <a:t>9/1/2022</a:t>
+              <a:t>9/3/2022</a:t>
             </a:fld>
             <a:endParaRPr lang="en-US"/>
           </a:p>
@@ -1827,7 +1827,7 @@
           <a:p>
             <a:fld id="{A522E3EC-CA61-4C0B-B5C8-CC92AB6EF10D}" type="datetimeFigureOut">
               <a:rPr lang="en-US" smtClean="0"/>
-              <a:t>9/1/2022</a:t>
+              <a:t>9/3/2022</a:t>
             </a:fld>
             <a:endParaRPr lang="en-US"/>
           </a:p>
@@ -1968,7 +1968,7 @@
           <a:p>
             <a:fld id="{A522E3EC-CA61-4C0B-B5C8-CC92AB6EF10D}" type="datetimeFigureOut">
               <a:rPr lang="en-US" smtClean="0"/>
-              <a:t>9/1/2022</a:t>
+              <a:t>9/3/2022</a:t>
             </a:fld>
             <a:endParaRPr lang="en-US"/>
           </a:p>
@@ -2081,7 +2081,7 @@
           <a:p>
             <a:fld id="{A522E3EC-CA61-4C0B-B5C8-CC92AB6EF10D}" type="datetimeFigureOut">
               <a:rPr lang="en-US" smtClean="0"/>
-              <a:t>9/1/2022</a:t>
+              <a:t>9/3/2022</a:t>
             </a:fld>
             <a:endParaRPr lang="en-US"/>
           </a:p>
@@ -2392,7 +2392,7 @@
           <a:p>
             <a:fld id="{A522E3EC-CA61-4C0B-B5C8-CC92AB6EF10D}" type="datetimeFigureOut">
               <a:rPr lang="en-US" smtClean="0"/>
-              <a:t>9/1/2022</a:t>
+              <a:t>9/3/2022</a:t>
             </a:fld>
             <a:endParaRPr lang="en-US"/>
           </a:p>
@@ -2680,7 +2680,7 @@
           <a:p>
             <a:fld id="{A522E3EC-CA61-4C0B-B5C8-CC92AB6EF10D}" type="datetimeFigureOut">
               <a:rPr lang="en-US" smtClean="0"/>
-              <a:t>9/1/2022</a:t>
+              <a:t>9/3/2022</a:t>
             </a:fld>
             <a:endParaRPr lang="en-US"/>
           </a:p>
@@ -2921,7 +2921,7 @@
           <a:p>
             <a:fld id="{A522E3EC-CA61-4C0B-B5C8-CC92AB6EF10D}" type="datetimeFigureOut">
               <a:rPr lang="en-US" smtClean="0"/>
-              <a:t>9/1/2022</a:t>
+              <a:t>9/3/2022</a:t>
             </a:fld>
             <a:endParaRPr lang="en-US"/>
           </a:p>
@@ -5628,7 +5628,9 @@
         </p:nvSpPr>
         <p:spPr/>
         <p:txBody>
-          <a:bodyPr/>
+          <a:bodyPr>
+            <a:normAutofit fontScale="92500" lnSpcReduction="20000"/>
+          </a:bodyPr>
           <a:lstStyle/>
           <a:p>
             <a:r>
@@ -5640,6 +5642,22 @@
             <a:r>
               <a:rPr lang="en-US" dirty="0"/>
               <a:t>Name TEXT</a:t>
+            </a:r>
+          </a:p>
+          <a:p>
+            <a:r>
+              <a:rPr lang="en-US" dirty="0"/>
+              <a:t>Room name TEXT</a:t>
+            </a:r>
+          </a:p>
+          <a:p>
+            <a:r>
+              <a:rPr lang="en-US" dirty="0" err="1"/>
+              <a:t>Start_date</a:t>
+            </a:r>
+            <a:r>
+              <a:rPr lang="en-US" dirty="0"/>
+              <a:t> DATE</a:t>
             </a:r>
           </a:p>
           <a:p>

</xml_diff>

<commit_message>
Add the data table
</commit_message>
<xml_diff>
--- a/CollaSciTablesrelationship.pptx
+++ b/CollaSciTablesrelationship.pptx
@@ -3715,7 +3715,7 @@
         <p:spPr/>
         <p:txBody>
           <a:bodyPr>
-            <a:normAutofit fontScale="92500" lnSpcReduction="20000"/>
+            <a:normAutofit fontScale="77500" lnSpcReduction="20000"/>
           </a:bodyPr>
           <a:lstStyle/>
           <a:p>
@@ -3736,6 +3736,16 @@
           </a:p>
           <a:p>
             <a:r>
+              <a:rPr lang="en-US" dirty="0" err="1"/>
+              <a:t>Experiment_no</a:t>
+            </a:r>
+            <a:r>
+              <a:rPr lang="en-US" dirty="0"/>
+              <a:t> INT </a:t>
+            </a:r>
+          </a:p>
+          <a:p>
+            <a:r>
               <a:rPr lang="en-US" dirty="0"/>
               <a:t>Field INT</a:t>
             </a:r>
@@ -3759,8 +3769,18 @@
           </a:p>
           <a:p>
             <a:r>
-              <a:rPr lang="en-US" dirty="0"/>
-              <a:t>Values </a:t>
+              <a:rPr lang="en-US" dirty="0" err="1"/>
+              <a:t>Path_import</a:t>
+            </a:r>
+            <a:r>
+              <a:rPr lang="en-US" dirty="0"/>
+              <a:t> TEXT</a:t>
+            </a:r>
+          </a:p>
+          <a:p>
+            <a:r>
+              <a:rPr lang="en-US" dirty="0"/>
+              <a:t>Comment TEXT</a:t>
             </a:r>
           </a:p>
           <a:p>

</xml_diff>

<commit_message>
add description of the database tables in the README file
</commit_message>
<xml_diff>
--- a/CollaSciTablesrelationship.pptx
+++ b/CollaSciTablesrelationship.pptx
@@ -6,12 +6,12 @@
   </p:sldMasterIdLst>
   <p:sldIdLst>
     <p:sldId id="256" r:id="rId2"/>
-    <p:sldId id="257" r:id="rId3"/>
-    <p:sldId id="258" r:id="rId4"/>
-    <p:sldId id="259" r:id="rId5"/>
-    <p:sldId id="260" r:id="rId6"/>
-    <p:sldId id="261" r:id="rId7"/>
-    <p:sldId id="262" r:id="rId8"/>
+    <p:sldId id="259" r:id="rId3"/>
+    <p:sldId id="260" r:id="rId4"/>
+    <p:sldId id="258" r:id="rId5"/>
+    <p:sldId id="257" r:id="rId6"/>
+    <p:sldId id="262" r:id="rId7"/>
+    <p:sldId id="261" r:id="rId8"/>
     <p:sldId id="263" r:id="rId9"/>
     <p:sldId id="264" r:id="rId10"/>
     <p:sldId id="265" r:id="rId11"/>
@@ -271,7 +271,7 @@
           <a:p>
             <a:fld id="{A522E3EC-CA61-4C0B-B5C8-CC92AB6EF10D}" type="datetimeFigureOut">
               <a:rPr lang="en-US" smtClean="0"/>
-              <a:t>9/6/2022</a:t>
+              <a:t>9/11/2022</a:t>
             </a:fld>
             <a:endParaRPr lang="en-US"/>
           </a:p>
@@ -469,7 +469,7 @@
           <a:p>
             <a:fld id="{A522E3EC-CA61-4C0B-B5C8-CC92AB6EF10D}" type="datetimeFigureOut">
               <a:rPr lang="en-US" smtClean="0"/>
-              <a:t>9/6/2022</a:t>
+              <a:t>9/11/2022</a:t>
             </a:fld>
             <a:endParaRPr lang="en-US"/>
           </a:p>
@@ -677,7 +677,7 @@
           <a:p>
             <a:fld id="{A522E3EC-CA61-4C0B-B5C8-CC92AB6EF10D}" type="datetimeFigureOut">
               <a:rPr lang="en-US" smtClean="0"/>
-              <a:t>9/6/2022</a:t>
+              <a:t>9/11/2022</a:t>
             </a:fld>
             <a:endParaRPr lang="en-US"/>
           </a:p>
@@ -875,7 +875,7 @@
           <a:p>
             <a:fld id="{A522E3EC-CA61-4C0B-B5C8-CC92AB6EF10D}" type="datetimeFigureOut">
               <a:rPr lang="en-US" smtClean="0"/>
-              <a:t>9/6/2022</a:t>
+              <a:t>9/11/2022</a:t>
             </a:fld>
             <a:endParaRPr lang="en-US"/>
           </a:p>
@@ -1150,7 +1150,7 @@
           <a:p>
             <a:fld id="{A522E3EC-CA61-4C0B-B5C8-CC92AB6EF10D}" type="datetimeFigureOut">
               <a:rPr lang="en-US" smtClean="0"/>
-              <a:t>9/6/2022</a:t>
+              <a:t>9/11/2022</a:t>
             </a:fld>
             <a:endParaRPr lang="en-US"/>
           </a:p>
@@ -1415,7 +1415,7 @@
           <a:p>
             <a:fld id="{A522E3EC-CA61-4C0B-B5C8-CC92AB6EF10D}" type="datetimeFigureOut">
               <a:rPr lang="en-US" smtClean="0"/>
-              <a:t>9/6/2022</a:t>
+              <a:t>9/11/2022</a:t>
             </a:fld>
             <a:endParaRPr lang="en-US"/>
           </a:p>
@@ -1827,7 +1827,7 @@
           <a:p>
             <a:fld id="{A522E3EC-CA61-4C0B-B5C8-CC92AB6EF10D}" type="datetimeFigureOut">
               <a:rPr lang="en-US" smtClean="0"/>
-              <a:t>9/6/2022</a:t>
+              <a:t>9/11/2022</a:t>
             </a:fld>
             <a:endParaRPr lang="en-US"/>
           </a:p>
@@ -1968,7 +1968,7 @@
           <a:p>
             <a:fld id="{A522E3EC-CA61-4C0B-B5C8-CC92AB6EF10D}" type="datetimeFigureOut">
               <a:rPr lang="en-US" smtClean="0"/>
-              <a:t>9/6/2022</a:t>
+              <a:t>9/11/2022</a:t>
             </a:fld>
             <a:endParaRPr lang="en-US"/>
           </a:p>
@@ -2081,7 +2081,7 @@
           <a:p>
             <a:fld id="{A522E3EC-CA61-4C0B-B5C8-CC92AB6EF10D}" type="datetimeFigureOut">
               <a:rPr lang="en-US" smtClean="0"/>
-              <a:t>9/6/2022</a:t>
+              <a:t>9/11/2022</a:t>
             </a:fld>
             <a:endParaRPr lang="en-US"/>
           </a:p>
@@ -2392,7 +2392,7 @@
           <a:p>
             <a:fld id="{A522E3EC-CA61-4C0B-B5C8-CC92AB6EF10D}" type="datetimeFigureOut">
               <a:rPr lang="en-US" smtClean="0"/>
-              <a:t>9/6/2022</a:t>
+              <a:t>9/11/2022</a:t>
             </a:fld>
             <a:endParaRPr lang="en-US"/>
           </a:p>
@@ -2680,7 +2680,7 @@
           <a:p>
             <a:fld id="{A522E3EC-CA61-4C0B-B5C8-CC92AB6EF10D}" type="datetimeFigureOut">
               <a:rPr lang="en-US" smtClean="0"/>
-              <a:t>9/6/2022</a:t>
+              <a:t>9/11/2022</a:t>
             </a:fld>
             <a:endParaRPr lang="en-US"/>
           </a:p>
@@ -2921,7 +2921,7 @@
           <a:p>
             <a:fld id="{A522E3EC-CA61-4C0B-B5C8-CC92AB6EF10D}" type="datetimeFigureOut">
               <a:rPr lang="en-US" smtClean="0"/>
-              <a:t>9/6/2022</a:t>
+              <a:t>9/11/2022</a:t>
             </a:fld>
             <a:endParaRPr lang="en-US"/>
           </a:p>
@@ -5177,7 +5177,7 @@
           <p:cNvPr id="2" name="Title 1">
             <a:extLst>
               <a:ext uri="{FF2B5EF4-FFF2-40B4-BE49-F238E27FC236}">
-                <a16:creationId xmlns:a16="http://schemas.microsoft.com/office/drawing/2014/main" id="{A910077E-7D60-152F-D46F-3768A4B4E2EE}"/>
+                <a16:creationId xmlns:a16="http://schemas.microsoft.com/office/drawing/2014/main" id="{44299AA9-4F17-1C9A-B07F-F298614935FB}"/>
               </a:ext>
             </a:extLst>
           </p:cNvPr>
@@ -5195,7 +5195,7 @@
           <a:p>
             <a:r>
               <a:rPr lang="en-US" dirty="0"/>
-              <a:t>User table</a:t>
+              <a:t>Status table</a:t>
             </a:r>
           </a:p>
         </p:txBody>
@@ -5205,7 +5205,7 @@
           <p:cNvPr id="3" name="Content Placeholder 2">
             <a:extLst>
               <a:ext uri="{FF2B5EF4-FFF2-40B4-BE49-F238E27FC236}">
-                <a16:creationId xmlns:a16="http://schemas.microsoft.com/office/drawing/2014/main" id="{500B2CFE-8136-8BAC-ECE3-B96E6896B761}"/>
+                <a16:creationId xmlns:a16="http://schemas.microsoft.com/office/drawing/2014/main" id="{802A6DCC-9DA4-E1BE-A96E-D8DA892A87B0}"/>
               </a:ext>
             </a:extLst>
           </p:cNvPr>
@@ -5223,47 +5223,13 @@
           <a:p>
             <a:r>
               <a:rPr lang="en-US" dirty="0"/>
-              <a:t>Id Primary Key</a:t>
-            </a:r>
-          </a:p>
-          <a:p>
-            <a:r>
-              <a:rPr lang="en-US" dirty="0" err="1"/>
-              <a:t>Firstname</a:t>
-            </a:r>
-            <a:r>
-              <a:rPr lang="en-US" dirty="0"/>
-              <a:t> Varchar(100)</a:t>
-            </a:r>
-          </a:p>
-          <a:p>
-            <a:r>
-              <a:rPr lang="en-US" dirty="0" err="1"/>
-              <a:t>Lastname</a:t>
-            </a:r>
-            <a:r>
-              <a:rPr lang="en-US" dirty="0"/>
-              <a:t> VARCHAR(100)</a:t>
-            </a:r>
-          </a:p>
-          <a:p>
-            <a:r>
-              <a:rPr lang="en-US" dirty="0" err="1"/>
-              <a:t>Status_id</a:t>
-            </a:r>
-            <a:r>
-              <a:rPr lang="en-US" dirty="0"/>
-              <a:t> Foreign Key from status</a:t>
-            </a:r>
-          </a:p>
-          <a:p>
-            <a:r>
-              <a:rPr lang="en-US" dirty="0" err="1"/>
-              <a:t>Laboratory_id</a:t>
-            </a:r>
-            <a:r>
-              <a:rPr lang="en-US" dirty="0"/>
-              <a:t> Foreign Key from laboratory</a:t>
+              <a:t>ID Primary key</a:t>
+            </a:r>
+          </a:p>
+          <a:p>
+            <a:r>
+              <a:rPr lang="en-US" dirty="0"/>
+              <a:t> Name VARCHAR(100)</a:t>
             </a:r>
           </a:p>
           <a:p>
@@ -5274,7 +5240,7 @@
     </p:spTree>
     <p:extLst>
       <p:ext uri="{BB962C8B-B14F-4D97-AF65-F5344CB8AC3E}">
-        <p14:creationId xmlns:p14="http://schemas.microsoft.com/office/powerpoint/2010/main" val="2342970108"/>
+        <p14:creationId xmlns:p14="http://schemas.microsoft.com/office/powerpoint/2010/main" val="320502854"/>
       </p:ext>
     </p:extLst>
   </p:cSld>
@@ -5306,7 +5272,7 @@
           <p:cNvPr id="2" name="Title 1">
             <a:extLst>
               <a:ext uri="{FF2B5EF4-FFF2-40B4-BE49-F238E27FC236}">
-                <a16:creationId xmlns:a16="http://schemas.microsoft.com/office/drawing/2014/main" id="{A44F43C2-847D-7D19-037C-66502DD911FD}"/>
+                <a16:creationId xmlns:a16="http://schemas.microsoft.com/office/drawing/2014/main" id="{87C331F4-D2A4-4E8D-84EE-A6F4CA3A996C}"/>
               </a:ext>
             </a:extLst>
           </p:cNvPr>
@@ -5324,7 +5290,7 @@
           <a:p>
             <a:r>
               <a:rPr lang="en-US" dirty="0"/>
-              <a:t>Laboratory table</a:t>
+              <a:t>University Table</a:t>
             </a:r>
           </a:p>
         </p:txBody>
@@ -5334,7 +5300,7 @@
           <p:cNvPr id="3" name="Content Placeholder 2">
             <a:extLst>
               <a:ext uri="{FF2B5EF4-FFF2-40B4-BE49-F238E27FC236}">
-                <a16:creationId xmlns:a16="http://schemas.microsoft.com/office/drawing/2014/main" id="{F75BF6A4-F86B-28A5-2007-BB347D8CACA1}"/>
+                <a16:creationId xmlns:a16="http://schemas.microsoft.com/office/drawing/2014/main" id="{441C8811-DAD6-2417-569C-C3DFF81B6EFA}"/>
               </a:ext>
             </a:extLst>
           </p:cNvPr>
@@ -5357,18 +5323,26 @@
           </a:p>
           <a:p>
             <a:r>
-              <a:rPr lang="en-US" dirty="0" err="1"/>
-              <a:t>University_id</a:t>
-            </a:r>
-            <a:r>
-              <a:rPr lang="en-US" dirty="0"/>
-              <a:t> Foreign Key from university</a:t>
-            </a:r>
-          </a:p>
-          <a:p>
-            <a:r>
-              <a:rPr lang="en-US" dirty="0"/>
-              <a:t>Name TEXT</a:t>
+              <a:rPr lang="en-US" dirty="0"/>
+              <a:t>Name VARCHAR(100)</a:t>
+            </a:r>
+          </a:p>
+          <a:p>
+            <a:r>
+              <a:rPr lang="en-US" dirty="0"/>
+              <a:t>Country VARCHAR(100)</a:t>
+            </a:r>
+          </a:p>
+          <a:p>
+            <a:r>
+              <a:rPr lang="en-US" dirty="0"/>
+              <a:t>City VARCHAR(100)</a:t>
+            </a:r>
+          </a:p>
+          <a:p>
+            <a:r>
+              <a:rPr lang="en-US" dirty="0"/>
+              <a:t>Address TEXT</a:t>
             </a:r>
           </a:p>
         </p:txBody>
@@ -5376,7 +5350,7 @@
     </p:spTree>
     <p:extLst>
       <p:ext uri="{BB962C8B-B14F-4D97-AF65-F5344CB8AC3E}">
-        <p14:creationId xmlns:p14="http://schemas.microsoft.com/office/powerpoint/2010/main" val="394263610"/>
+        <p14:creationId xmlns:p14="http://schemas.microsoft.com/office/powerpoint/2010/main" val="3943958958"/>
       </p:ext>
     </p:extLst>
   </p:cSld>
@@ -5408,7 +5382,7 @@
           <p:cNvPr id="2" name="Title 1">
             <a:extLst>
               <a:ext uri="{FF2B5EF4-FFF2-40B4-BE49-F238E27FC236}">
-                <a16:creationId xmlns:a16="http://schemas.microsoft.com/office/drawing/2014/main" id="{44299AA9-4F17-1C9A-B07F-F298614935FB}"/>
+                <a16:creationId xmlns:a16="http://schemas.microsoft.com/office/drawing/2014/main" id="{A44F43C2-847D-7D19-037C-66502DD911FD}"/>
               </a:ext>
             </a:extLst>
           </p:cNvPr>
@@ -5426,7 +5400,7 @@
           <a:p>
             <a:r>
               <a:rPr lang="en-US" dirty="0"/>
-              <a:t>Status table</a:t>
+              <a:t>Laboratory table</a:t>
             </a:r>
           </a:p>
         </p:txBody>
@@ -5436,7 +5410,7 @@
           <p:cNvPr id="3" name="Content Placeholder 2">
             <a:extLst>
               <a:ext uri="{FF2B5EF4-FFF2-40B4-BE49-F238E27FC236}">
-                <a16:creationId xmlns:a16="http://schemas.microsoft.com/office/drawing/2014/main" id="{802A6DCC-9DA4-E1BE-A96E-D8DA892A87B0}"/>
+                <a16:creationId xmlns:a16="http://schemas.microsoft.com/office/drawing/2014/main" id="{F75BF6A4-F86B-28A5-2007-BB347D8CACA1}"/>
               </a:ext>
             </a:extLst>
           </p:cNvPr>
@@ -5454,24 +5428,31 @@
           <a:p>
             <a:r>
               <a:rPr lang="en-US" dirty="0"/>
-              <a:t>ID Primary key</a:t>
-            </a:r>
-          </a:p>
-          <a:p>
-            <a:r>
-              <a:rPr lang="en-US" dirty="0"/>
-              <a:t> Name VARCHAR(100)</a:t>
-            </a:r>
-          </a:p>
-          <a:p>
-            <a:endParaRPr lang="en-US" dirty="0"/>
+              <a:t>ID Primary Key</a:t>
+            </a:r>
+          </a:p>
+          <a:p>
+            <a:r>
+              <a:rPr lang="en-US" dirty="0" err="1"/>
+              <a:t>University_id</a:t>
+            </a:r>
+            <a:r>
+              <a:rPr lang="en-US" dirty="0"/>
+              <a:t> Foreign Key from university</a:t>
+            </a:r>
+          </a:p>
+          <a:p>
+            <a:r>
+              <a:rPr lang="en-US" dirty="0"/>
+              <a:t>Name TEXT</a:t>
+            </a:r>
           </a:p>
         </p:txBody>
       </p:sp>
     </p:spTree>
     <p:extLst>
       <p:ext uri="{BB962C8B-B14F-4D97-AF65-F5344CB8AC3E}">
-        <p14:creationId xmlns:p14="http://schemas.microsoft.com/office/powerpoint/2010/main" val="320502854"/>
+        <p14:creationId xmlns:p14="http://schemas.microsoft.com/office/powerpoint/2010/main" val="394263610"/>
       </p:ext>
     </p:extLst>
   </p:cSld>
@@ -5503,7 +5484,7 @@
           <p:cNvPr id="2" name="Title 1">
             <a:extLst>
               <a:ext uri="{FF2B5EF4-FFF2-40B4-BE49-F238E27FC236}">
-                <a16:creationId xmlns:a16="http://schemas.microsoft.com/office/drawing/2014/main" id="{87C331F4-D2A4-4E8D-84EE-A6F4CA3A996C}"/>
+                <a16:creationId xmlns:a16="http://schemas.microsoft.com/office/drawing/2014/main" id="{A910077E-7D60-152F-D46F-3768A4B4E2EE}"/>
               </a:ext>
             </a:extLst>
           </p:cNvPr>
@@ -5521,7 +5502,7 @@
           <a:p>
             <a:r>
               <a:rPr lang="en-US" dirty="0"/>
-              <a:t>University Table</a:t>
+              <a:t>User table</a:t>
             </a:r>
           </a:p>
         </p:txBody>
@@ -5531,7 +5512,7 @@
           <p:cNvPr id="3" name="Content Placeholder 2">
             <a:extLst>
               <a:ext uri="{FF2B5EF4-FFF2-40B4-BE49-F238E27FC236}">
-                <a16:creationId xmlns:a16="http://schemas.microsoft.com/office/drawing/2014/main" id="{441C8811-DAD6-2417-569C-C3DFF81B6EFA}"/>
+                <a16:creationId xmlns:a16="http://schemas.microsoft.com/office/drawing/2014/main" id="{500B2CFE-8136-8BAC-ECE3-B96E6896B761}"/>
               </a:ext>
             </a:extLst>
           </p:cNvPr>
@@ -5549,39 +5530,58 @@
           <a:p>
             <a:r>
               <a:rPr lang="en-US" dirty="0"/>
-              <a:t>ID Primary Key</a:t>
-            </a:r>
-          </a:p>
-          <a:p>
-            <a:r>
-              <a:rPr lang="en-US" dirty="0"/>
-              <a:t>Name VARCHAR(100)</a:t>
-            </a:r>
-          </a:p>
-          <a:p>
-            <a:r>
-              <a:rPr lang="en-US" dirty="0"/>
-              <a:t>Country VARCHAR(100)</a:t>
-            </a:r>
-          </a:p>
-          <a:p>
-            <a:r>
-              <a:rPr lang="en-US" dirty="0"/>
-              <a:t>City VARCHAR(100)</a:t>
-            </a:r>
-          </a:p>
-          <a:p>
-            <a:r>
-              <a:rPr lang="en-US" dirty="0"/>
-              <a:t>Address TEXT</a:t>
-            </a:r>
+              <a:t>Id Primary Key</a:t>
+            </a:r>
+          </a:p>
+          <a:p>
+            <a:r>
+              <a:rPr lang="en-US" dirty="0" err="1"/>
+              <a:t>Firstname</a:t>
+            </a:r>
+            <a:r>
+              <a:rPr lang="en-US" dirty="0"/>
+              <a:t> Varchar(100)</a:t>
+            </a:r>
+          </a:p>
+          <a:p>
+            <a:r>
+              <a:rPr lang="en-US" dirty="0" err="1"/>
+              <a:t>Lastname</a:t>
+            </a:r>
+            <a:r>
+              <a:rPr lang="en-US" dirty="0"/>
+              <a:t> VARCHAR(100)</a:t>
+            </a:r>
+          </a:p>
+          <a:p>
+            <a:r>
+              <a:rPr lang="en-US" dirty="0" err="1"/>
+              <a:t>Status_id</a:t>
+            </a:r>
+            <a:r>
+              <a:rPr lang="en-US" dirty="0"/>
+              <a:t> Foreign Key from status</a:t>
+            </a:r>
+          </a:p>
+          <a:p>
+            <a:r>
+              <a:rPr lang="en-US" dirty="0" err="1"/>
+              <a:t>Laboratory_id</a:t>
+            </a:r>
+            <a:r>
+              <a:rPr lang="en-US" dirty="0"/>
+              <a:t> Foreign Key from laboratory</a:t>
+            </a:r>
+          </a:p>
+          <a:p>
+            <a:endParaRPr lang="en-US" dirty="0"/>
           </a:p>
         </p:txBody>
       </p:sp>
     </p:spTree>
     <p:extLst>
       <p:ext uri="{BB962C8B-B14F-4D97-AF65-F5344CB8AC3E}">
-        <p14:creationId xmlns:p14="http://schemas.microsoft.com/office/powerpoint/2010/main" val="3943958958"/>
+        <p14:creationId xmlns:p14="http://schemas.microsoft.com/office/powerpoint/2010/main" val="2342970108"/>
       </p:ext>
     </p:extLst>
   </p:cSld>
@@ -5613,7 +5613,7 @@
           <p:cNvPr id="2" name="Title 1">
             <a:extLst>
               <a:ext uri="{FF2B5EF4-FFF2-40B4-BE49-F238E27FC236}">
-                <a16:creationId xmlns:a16="http://schemas.microsoft.com/office/drawing/2014/main" id="{EF3D90BB-DFA4-15E1-8023-A3EA5C5BF66F}"/>
+                <a16:creationId xmlns:a16="http://schemas.microsoft.com/office/drawing/2014/main" id="{8AC2E183-9E95-99A4-1D5A-2113E4F1E1D1}"/>
               </a:ext>
             </a:extLst>
           </p:cNvPr>
@@ -5631,7 +5631,7 @@
           <a:p>
             <a:r>
               <a:rPr lang="en-US" dirty="0"/>
-              <a:t>Experiment setup table</a:t>
+              <a:t>Experiment type table</a:t>
             </a:r>
           </a:p>
         </p:txBody>
@@ -5641,7 +5641,7 @@
           <p:cNvPr id="3" name="Content Placeholder 2">
             <a:extLst>
               <a:ext uri="{FF2B5EF4-FFF2-40B4-BE49-F238E27FC236}">
-                <a16:creationId xmlns:a16="http://schemas.microsoft.com/office/drawing/2014/main" id="{A763D305-891E-6B00-5063-FA1563597F40}"/>
+                <a16:creationId xmlns:a16="http://schemas.microsoft.com/office/drawing/2014/main" id="{51731232-6CEC-CC0F-5165-458FCF329B2D}"/>
               </a:ext>
             </a:extLst>
           </p:cNvPr>
@@ -5654,101 +5654,18 @@
         </p:nvSpPr>
         <p:spPr/>
         <p:txBody>
-          <a:bodyPr>
-            <a:normAutofit fontScale="92500" lnSpcReduction="20000"/>
-          </a:bodyPr>
-          <a:lstStyle/>
-          <a:p>
-            <a:r>
-              <a:rPr lang="en-US" dirty="0"/>
-              <a:t>ID Primary Key</a:t>
+          <a:bodyPr/>
+          <a:lstStyle/>
+          <a:p>
+            <a:r>
+              <a:rPr lang="en-US" dirty="0"/>
+              <a:t>Id Primary Key</a:t>
             </a:r>
           </a:p>
           <a:p>
             <a:r>
               <a:rPr lang="en-US" dirty="0"/>
               <a:t>Name TEXT</a:t>
-            </a:r>
-          </a:p>
-          <a:p>
-            <a:r>
-              <a:rPr lang="en-US" dirty="0"/>
-              <a:t>Room name TEXT</a:t>
-            </a:r>
-          </a:p>
-          <a:p>
-            <a:r>
-              <a:rPr lang="en-US" dirty="0" err="1"/>
-              <a:t>Start_date</a:t>
-            </a:r>
-            <a:r>
-              <a:rPr lang="en-US" dirty="0"/>
-              <a:t> DATE</a:t>
-            </a:r>
-          </a:p>
-          <a:p>
-            <a:r>
-              <a:rPr lang="en-US" dirty="0" err="1"/>
-              <a:t>Min_field</a:t>
-            </a:r>
-            <a:r>
-              <a:rPr lang="en-US" dirty="0"/>
-              <a:t>  INT</a:t>
-            </a:r>
-          </a:p>
-          <a:p>
-            <a:r>
-              <a:rPr lang="en-US" dirty="0" err="1"/>
-              <a:t>Max_field</a:t>
-            </a:r>
-            <a:r>
-              <a:rPr lang="en-US" dirty="0"/>
-              <a:t> INT</a:t>
-            </a:r>
-          </a:p>
-          <a:p>
-            <a:r>
-              <a:rPr lang="en-US" dirty="0" err="1"/>
-              <a:t>Min_temp</a:t>
-            </a:r>
-            <a:r>
-              <a:rPr lang="en-US" dirty="0"/>
-              <a:t> INT</a:t>
-            </a:r>
-          </a:p>
-          <a:p>
-            <a:r>
-              <a:rPr lang="en-US" dirty="0" err="1"/>
-              <a:t>Max_temp</a:t>
-            </a:r>
-            <a:r>
-              <a:rPr lang="en-US" dirty="0"/>
-              <a:t> INT</a:t>
-            </a:r>
-          </a:p>
-          <a:p>
-            <a:r>
-              <a:rPr lang="en-US" dirty="0" err="1"/>
-              <a:t>Experiment_type_ID</a:t>
-            </a:r>
-            <a:r>
-              <a:rPr lang="en-US" dirty="0"/>
-              <a:t> Foreign Key from </a:t>
-            </a:r>
-            <a:r>
-              <a:rPr lang="en-US" dirty="0" err="1"/>
-              <a:t>experiment_type</a:t>
-            </a:r>
-            <a:endParaRPr lang="en-US" dirty="0"/>
-          </a:p>
-          <a:p>
-            <a:r>
-              <a:rPr lang="en-US" dirty="0" err="1"/>
-              <a:t>Responsible_id</a:t>
-            </a:r>
-            <a:r>
-              <a:rPr lang="en-US" dirty="0"/>
-              <a:t> Foreign Key from user</a:t>
             </a:r>
           </a:p>
         </p:txBody>
@@ -5756,7 +5673,7 @@
     </p:spTree>
     <p:extLst>
       <p:ext uri="{BB962C8B-B14F-4D97-AF65-F5344CB8AC3E}">
-        <p14:creationId xmlns:p14="http://schemas.microsoft.com/office/powerpoint/2010/main" val="1941508757"/>
+        <p14:creationId xmlns:p14="http://schemas.microsoft.com/office/powerpoint/2010/main" val="3462193604"/>
       </p:ext>
     </p:extLst>
   </p:cSld>
@@ -5788,7 +5705,7 @@
           <p:cNvPr id="2" name="Title 1">
             <a:extLst>
               <a:ext uri="{FF2B5EF4-FFF2-40B4-BE49-F238E27FC236}">
-                <a16:creationId xmlns:a16="http://schemas.microsoft.com/office/drawing/2014/main" id="{8AC2E183-9E95-99A4-1D5A-2113E4F1E1D1}"/>
+                <a16:creationId xmlns:a16="http://schemas.microsoft.com/office/drawing/2014/main" id="{EF3D90BB-DFA4-15E1-8023-A3EA5C5BF66F}"/>
               </a:ext>
             </a:extLst>
           </p:cNvPr>
@@ -5806,7 +5723,7 @@
           <a:p>
             <a:r>
               <a:rPr lang="en-US" dirty="0"/>
-              <a:t>Experiment type table</a:t>
+              <a:t>Experiment setup table</a:t>
             </a:r>
           </a:p>
         </p:txBody>
@@ -5816,7 +5733,7 @@
           <p:cNvPr id="3" name="Content Placeholder 2">
             <a:extLst>
               <a:ext uri="{FF2B5EF4-FFF2-40B4-BE49-F238E27FC236}">
-                <a16:creationId xmlns:a16="http://schemas.microsoft.com/office/drawing/2014/main" id="{51731232-6CEC-CC0F-5165-458FCF329B2D}"/>
+                <a16:creationId xmlns:a16="http://schemas.microsoft.com/office/drawing/2014/main" id="{A763D305-891E-6B00-5063-FA1563597F40}"/>
               </a:ext>
             </a:extLst>
           </p:cNvPr>
@@ -5829,18 +5746,101 @@
         </p:nvSpPr>
         <p:spPr/>
         <p:txBody>
-          <a:bodyPr/>
-          <a:lstStyle/>
-          <a:p>
-            <a:r>
-              <a:rPr lang="en-US" dirty="0"/>
-              <a:t>Id Primary Key</a:t>
+          <a:bodyPr>
+            <a:normAutofit fontScale="92500" lnSpcReduction="20000"/>
+          </a:bodyPr>
+          <a:lstStyle/>
+          <a:p>
+            <a:r>
+              <a:rPr lang="en-US" dirty="0"/>
+              <a:t>ID Primary Key</a:t>
             </a:r>
           </a:p>
           <a:p>
             <a:r>
               <a:rPr lang="en-US" dirty="0"/>
               <a:t>Name TEXT</a:t>
+            </a:r>
+          </a:p>
+          <a:p>
+            <a:r>
+              <a:rPr lang="en-US" dirty="0"/>
+              <a:t>Room name TEXT</a:t>
+            </a:r>
+          </a:p>
+          <a:p>
+            <a:r>
+              <a:rPr lang="en-US" dirty="0" err="1"/>
+              <a:t>Start_date</a:t>
+            </a:r>
+            <a:r>
+              <a:rPr lang="en-US" dirty="0"/>
+              <a:t> DATE</a:t>
+            </a:r>
+          </a:p>
+          <a:p>
+            <a:r>
+              <a:rPr lang="en-US" dirty="0" err="1"/>
+              <a:t>Min_field</a:t>
+            </a:r>
+            <a:r>
+              <a:rPr lang="en-US" dirty="0"/>
+              <a:t>  INT</a:t>
+            </a:r>
+          </a:p>
+          <a:p>
+            <a:r>
+              <a:rPr lang="en-US" dirty="0" err="1"/>
+              <a:t>Max_field</a:t>
+            </a:r>
+            <a:r>
+              <a:rPr lang="en-US" dirty="0"/>
+              <a:t> INT</a:t>
+            </a:r>
+          </a:p>
+          <a:p>
+            <a:r>
+              <a:rPr lang="en-US" dirty="0" err="1"/>
+              <a:t>Min_temp</a:t>
+            </a:r>
+            <a:r>
+              <a:rPr lang="en-US" dirty="0"/>
+              <a:t> INT</a:t>
+            </a:r>
+          </a:p>
+          <a:p>
+            <a:r>
+              <a:rPr lang="en-US" dirty="0" err="1"/>
+              <a:t>Max_temp</a:t>
+            </a:r>
+            <a:r>
+              <a:rPr lang="en-US" dirty="0"/>
+              <a:t> INT</a:t>
+            </a:r>
+          </a:p>
+          <a:p>
+            <a:r>
+              <a:rPr lang="en-US" dirty="0" err="1"/>
+              <a:t>Experiment_type_ID</a:t>
+            </a:r>
+            <a:r>
+              <a:rPr lang="en-US" dirty="0"/>
+              <a:t> Foreign Key from </a:t>
+            </a:r>
+            <a:r>
+              <a:rPr lang="en-US" dirty="0" err="1"/>
+              <a:t>experiment_type</a:t>
+            </a:r>
+            <a:endParaRPr lang="en-US" dirty="0"/>
+          </a:p>
+          <a:p>
+            <a:r>
+              <a:rPr lang="en-US" dirty="0" err="1"/>
+              <a:t>Responsible_id</a:t>
+            </a:r>
+            <a:r>
+              <a:rPr lang="en-US" dirty="0"/>
+              <a:t> Foreign Key from user</a:t>
             </a:r>
           </a:p>
         </p:txBody>
@@ -5848,7 +5848,7 @@
     </p:spTree>
     <p:extLst>
       <p:ext uri="{BB962C8B-B14F-4D97-AF65-F5344CB8AC3E}">
-        <p14:creationId xmlns:p14="http://schemas.microsoft.com/office/powerpoint/2010/main" val="3462193604"/>
+        <p14:creationId xmlns:p14="http://schemas.microsoft.com/office/powerpoint/2010/main" val="1941508757"/>
       </p:ext>
     </p:extLst>
   </p:cSld>

</xml_diff>